<commit_message>
Added my share of ppt and readme and some models
</commit_message>
<xml_diff>
--- a/bemutato.pptx
+++ b/bemutato.pptx
@@ -22,6 +22,15 @@
     <p:sldId id="270" r:id="rId16"/>
     <p:sldId id="271" r:id="rId17"/>
     <p:sldId id="272" r:id="rId18"/>
+    <p:sldId id="273" r:id="rId19"/>
+    <p:sldId id="275" r:id="rId20"/>
+    <p:sldId id="276" r:id="rId21"/>
+    <p:sldId id="282" r:id="rId22"/>
+    <p:sldId id="281" r:id="rId23"/>
+    <p:sldId id="277" r:id="rId24"/>
+    <p:sldId id="278" r:id="rId25"/>
+    <p:sldId id="279" r:id="rId26"/>
+    <p:sldId id="280" r:id="rId27"/>
   </p:sldIdLst>
   <p:sldSz cx="12192000" cy="6858000"/>
   <p:notesSz cx="6858000" cy="9144000"/>
@@ -7985,6 +7994,290 @@
 </p:sld>
 </file>
 
+<file path=ppt/slides/slide18.xml><?xml version="1.0" encoding="utf-8"?>
+<p:sld xmlns:a="http://schemas.openxmlformats.org/drawingml/2006/main" xmlns:r="http://schemas.openxmlformats.org/officeDocument/2006/relationships" xmlns:p="http://schemas.openxmlformats.org/presentationml/2006/main">
+  <p:cSld>
+    <p:spTree>
+      <p:nvGrpSpPr>
+        <p:cNvPr id="1" name=""/>
+        <p:cNvGrpSpPr/>
+        <p:nvPr/>
+      </p:nvGrpSpPr>
+      <p:grpSpPr>
+        <a:xfrm>
+          <a:off x="0" y="0"/>
+          <a:ext cx="0" cy="0"/>
+          <a:chOff x="0" y="0"/>
+          <a:chExt cx="0" cy="0"/>
+        </a:xfrm>
+      </p:grpSpPr>
+      <p:sp>
+        <p:nvSpPr>
+          <p:cNvPr id="2" name="Cím 1">
+            <a:extLst>
+              <a:ext uri="{FF2B5EF4-FFF2-40B4-BE49-F238E27FC236}">
+                <a16:creationId xmlns:a16="http://schemas.microsoft.com/office/drawing/2014/main" id="{B16A0DA1-0726-427B-BB43-F7E471A90ADD}"/>
+              </a:ext>
+            </a:extLst>
+          </p:cNvPr>
+          <p:cNvSpPr>
+            <a:spLocks noGrp="1"/>
+          </p:cNvSpPr>
+          <p:nvPr>
+            <p:ph type="title"/>
+          </p:nvPr>
+        </p:nvSpPr>
+        <p:spPr/>
+        <p:txBody>
+          <a:bodyPr/>
+          <a:lstStyle/>
+          <a:p>
+            <a:r>
+              <a:rPr lang="hu-HU" dirty="0"/>
+              <a:t>Géczi Dániel Csanád</a:t>
+            </a:r>
+          </a:p>
+        </p:txBody>
+      </p:sp>
+      <p:sp>
+        <p:nvSpPr>
+          <p:cNvPr id="3" name="Tartalom helye 2">
+            <a:extLst>
+              <a:ext uri="{FF2B5EF4-FFF2-40B4-BE49-F238E27FC236}">
+                <a16:creationId xmlns:a16="http://schemas.microsoft.com/office/drawing/2014/main" id="{46622A5D-36F8-4658-AF0B-E3350FCF442E}"/>
+              </a:ext>
+            </a:extLst>
+          </p:cNvPr>
+          <p:cNvSpPr>
+            <a:spLocks noGrp="1"/>
+          </p:cNvSpPr>
+          <p:nvPr>
+            <p:ph idx="1"/>
+          </p:nvPr>
+        </p:nvSpPr>
+        <p:spPr>
+          <a:xfrm>
+            <a:off x="1069848" y="2347783"/>
+            <a:ext cx="10058400" cy="1609344"/>
+          </a:xfrm>
+        </p:spPr>
+        <p:txBody>
+          <a:bodyPr>
+            <a:normAutofit/>
+          </a:bodyPr>
+          <a:lstStyle/>
+          <a:p>
+            <a:r>
+              <a:rPr lang="hu-HU" sz="2800" dirty="0"/>
+              <a:t>Dimenzió redukció végrehajtása</a:t>
+            </a:r>
+          </a:p>
+          <a:p>
+            <a:r>
+              <a:rPr lang="hu-HU" sz="2800" dirty="0"/>
+              <a:t>További modellek taníttatása</a:t>
+            </a:r>
+          </a:p>
+        </p:txBody>
+      </p:sp>
+      <p:sp>
+        <p:nvSpPr>
+          <p:cNvPr id="4" name="Szövegdoboz 3">
+            <a:extLst>
+              <a:ext uri="{FF2B5EF4-FFF2-40B4-BE49-F238E27FC236}">
+                <a16:creationId xmlns:a16="http://schemas.microsoft.com/office/drawing/2014/main" id="{6A1FDA9F-7109-4F8E-B302-F76E6FA01099}"/>
+              </a:ext>
+            </a:extLst>
+          </p:cNvPr>
+          <p:cNvSpPr txBox="1"/>
+          <p:nvPr/>
+        </p:nvSpPr>
+        <p:spPr>
+          <a:xfrm>
+            <a:off x="1128584" y="1540475"/>
+            <a:ext cx="4967416" cy="646331"/>
+          </a:xfrm>
+          <a:prstGeom prst="rect">
+            <a:avLst/>
+          </a:prstGeom>
+          <a:noFill/>
+        </p:spPr>
+        <p:txBody>
+          <a:bodyPr wrap="square" rtlCol="0">
+            <a:spAutoFit/>
+          </a:bodyPr>
+          <a:lstStyle/>
+          <a:p>
+            <a:r>
+              <a:rPr lang="hu-HU" sz="3600" dirty="0"/>
+              <a:t>Feladatom</a:t>
+            </a:r>
+          </a:p>
+        </p:txBody>
+      </p:sp>
+    </p:spTree>
+    <p:extLst>
+      <p:ext uri="{BB962C8B-B14F-4D97-AF65-F5344CB8AC3E}">
+        <p14:creationId xmlns:p14="http://schemas.microsoft.com/office/powerpoint/2010/main" val="649557597"/>
+      </p:ext>
+    </p:extLst>
+  </p:cSld>
+  <p:clrMapOvr>
+    <a:masterClrMapping/>
+  </p:clrMapOvr>
+</p:sld>
+</file>
+
+<file path=ppt/slides/slide19.xml><?xml version="1.0" encoding="utf-8"?>
+<p:sld xmlns:a="http://schemas.openxmlformats.org/drawingml/2006/main" xmlns:r="http://schemas.openxmlformats.org/officeDocument/2006/relationships" xmlns:p="http://schemas.openxmlformats.org/presentationml/2006/main">
+  <p:cSld>
+    <p:spTree>
+      <p:nvGrpSpPr>
+        <p:cNvPr id="1" name=""/>
+        <p:cNvGrpSpPr/>
+        <p:nvPr/>
+      </p:nvGrpSpPr>
+      <p:grpSpPr>
+        <a:xfrm>
+          <a:off x="0" y="0"/>
+          <a:ext cx="0" cy="0"/>
+          <a:chOff x="0" y="0"/>
+          <a:chExt cx="0" cy="0"/>
+        </a:xfrm>
+      </p:grpSpPr>
+      <p:sp>
+        <p:nvSpPr>
+          <p:cNvPr id="2" name="Cím 1">
+            <a:extLst>
+              <a:ext uri="{FF2B5EF4-FFF2-40B4-BE49-F238E27FC236}">
+                <a16:creationId xmlns:a16="http://schemas.microsoft.com/office/drawing/2014/main" id="{0B25B04E-A242-4FE0-8E36-400003882D94}"/>
+              </a:ext>
+            </a:extLst>
+          </p:cNvPr>
+          <p:cNvSpPr>
+            <a:spLocks noGrp="1"/>
+          </p:cNvSpPr>
+          <p:nvPr>
+            <p:ph type="title"/>
+          </p:nvPr>
+        </p:nvSpPr>
+        <p:spPr/>
+        <p:txBody>
+          <a:bodyPr/>
+          <a:lstStyle/>
+          <a:p>
+            <a:r>
+              <a:rPr lang="hu-HU" dirty="0"/>
+              <a:t>Dimenzió redukció</a:t>
+            </a:r>
+          </a:p>
+        </p:txBody>
+      </p:sp>
+      <p:sp>
+        <p:nvSpPr>
+          <p:cNvPr id="3" name="Tartalom helye 2">
+            <a:extLst>
+              <a:ext uri="{FF2B5EF4-FFF2-40B4-BE49-F238E27FC236}">
+                <a16:creationId xmlns:a16="http://schemas.microsoft.com/office/drawing/2014/main" id="{F8A06C3B-CB72-4155-A8FE-10BD53CD16DC}"/>
+              </a:ext>
+            </a:extLst>
+          </p:cNvPr>
+          <p:cNvSpPr>
+            <a:spLocks noGrp="1"/>
+          </p:cNvSpPr>
+          <p:nvPr>
+            <p:ph idx="1"/>
+          </p:nvPr>
+        </p:nvSpPr>
+        <p:spPr>
+          <a:xfrm>
+            <a:off x="1069848" y="2121408"/>
+            <a:ext cx="10058400" cy="1001354"/>
+          </a:xfrm>
+        </p:spPr>
+        <p:txBody>
+          <a:bodyPr/>
+          <a:lstStyle/>
+          <a:p>
+            <a:r>
+              <a:rPr lang="hu-HU" dirty="0"/>
+              <a:t>SVD-vel (</a:t>
+            </a:r>
+            <a:r>
+              <a:rPr lang="hu-HU" dirty="0" err="1"/>
+              <a:t>Single</a:t>
+            </a:r>
+            <a:r>
+              <a:rPr lang="hu-HU" dirty="0"/>
+              <a:t> </a:t>
+            </a:r>
+            <a:r>
+              <a:rPr lang="hu-HU" dirty="0" err="1"/>
+              <a:t>Value</a:t>
+            </a:r>
+            <a:r>
+              <a:rPr lang="hu-HU" dirty="0"/>
+              <a:t> </a:t>
+            </a:r>
+            <a:r>
+              <a:rPr lang="hu-HU" dirty="0" err="1"/>
+              <a:t>Decomposition</a:t>
+            </a:r>
+            <a:endParaRPr lang="hu-HU" dirty="0"/>
+          </a:p>
+          <a:p>
+            <a:r>
+              <a:rPr lang="hu-HU" dirty="0"/>
+              <a:t>PCA-</a:t>
+            </a:r>
+            <a:r>
+              <a:rPr lang="hu-HU" dirty="0" err="1"/>
+              <a:t>val</a:t>
+            </a:r>
+            <a:r>
+              <a:rPr lang="hu-HU" dirty="0"/>
+              <a:t> (</a:t>
+            </a:r>
+            <a:r>
+              <a:rPr lang="hu-HU" dirty="0" err="1"/>
+              <a:t>Principal</a:t>
+            </a:r>
+            <a:r>
+              <a:rPr lang="hu-HU" dirty="0"/>
+              <a:t> </a:t>
+            </a:r>
+            <a:r>
+              <a:rPr lang="hu-HU" dirty="0" err="1"/>
+              <a:t>component</a:t>
+            </a:r>
+            <a:r>
+              <a:rPr lang="hu-HU" dirty="0"/>
+              <a:t> </a:t>
+            </a:r>
+            <a:r>
+              <a:rPr lang="hu-HU" dirty="0" err="1"/>
+              <a:t>analysis</a:t>
+            </a:r>
+            <a:r>
+              <a:rPr lang="hu-HU" dirty="0"/>
+              <a:t>)</a:t>
+            </a:r>
+          </a:p>
+        </p:txBody>
+      </p:sp>
+    </p:spTree>
+    <p:extLst>
+      <p:ext uri="{BB962C8B-B14F-4D97-AF65-F5344CB8AC3E}">
+        <p14:creationId xmlns:p14="http://schemas.microsoft.com/office/powerpoint/2010/main" val="1477464383"/>
+      </p:ext>
+    </p:extLst>
+  </p:cSld>
+  <p:clrMapOvr>
+    <a:masterClrMapping/>
+  </p:clrMapOvr>
+</p:sld>
+</file>
+
 <file path=ppt/slides/slide2.xml><?xml version="1.0" encoding="utf-8"?>
 <p:sld xmlns:a="http://schemas.openxmlformats.org/drawingml/2006/main" xmlns:r="http://schemas.openxmlformats.org/officeDocument/2006/relationships" xmlns:p="http://schemas.openxmlformats.org/presentationml/2006/main">
   <p:cSld>
@@ -8075,6 +8368,1951 @@
     <p:extLst>
       <p:ext uri="{BB962C8B-B14F-4D97-AF65-F5344CB8AC3E}">
         <p14:creationId xmlns:p14="http://schemas.microsoft.com/office/powerpoint/2010/main" val="2018601831"/>
+      </p:ext>
+    </p:extLst>
+  </p:cSld>
+  <p:clrMapOvr>
+    <a:masterClrMapping/>
+  </p:clrMapOvr>
+</p:sld>
+</file>
+
+<file path=ppt/slides/slide20.xml><?xml version="1.0" encoding="utf-8"?>
+<p:sld xmlns:a="http://schemas.openxmlformats.org/drawingml/2006/main" xmlns:r="http://schemas.openxmlformats.org/officeDocument/2006/relationships" xmlns:p="http://schemas.openxmlformats.org/presentationml/2006/main">
+  <p:cSld>
+    <p:spTree>
+      <p:nvGrpSpPr>
+        <p:cNvPr id="1" name=""/>
+        <p:cNvGrpSpPr/>
+        <p:nvPr/>
+      </p:nvGrpSpPr>
+      <p:grpSpPr>
+        <a:xfrm>
+          <a:off x="0" y="0"/>
+          <a:ext cx="0" cy="0"/>
+          <a:chOff x="0" y="0"/>
+          <a:chExt cx="0" cy="0"/>
+        </a:xfrm>
+      </p:grpSpPr>
+      <p:sp>
+        <p:nvSpPr>
+          <p:cNvPr id="2" name="Cím 1">
+            <a:extLst>
+              <a:ext uri="{FF2B5EF4-FFF2-40B4-BE49-F238E27FC236}">
+                <a16:creationId xmlns:a16="http://schemas.microsoft.com/office/drawing/2014/main" id="{4FD1ED50-906F-4D64-8636-4092A0BA0D2E}"/>
+              </a:ext>
+            </a:extLst>
+          </p:cNvPr>
+          <p:cNvSpPr>
+            <a:spLocks noGrp="1"/>
+          </p:cNvSpPr>
+          <p:nvPr>
+            <p:ph type="title"/>
+          </p:nvPr>
+        </p:nvSpPr>
+        <p:spPr/>
+        <p:txBody>
+          <a:bodyPr/>
+          <a:lstStyle/>
+          <a:p>
+            <a:r>
+              <a:rPr lang="hu-HU" dirty="0"/>
+              <a:t>Modellek taníttatása</a:t>
+            </a:r>
+          </a:p>
+        </p:txBody>
+      </p:sp>
+      <p:sp>
+        <p:nvSpPr>
+          <p:cNvPr id="3" name="Tartalom helye 2">
+            <a:extLst>
+              <a:ext uri="{FF2B5EF4-FFF2-40B4-BE49-F238E27FC236}">
+                <a16:creationId xmlns:a16="http://schemas.microsoft.com/office/drawing/2014/main" id="{8C8C4C35-9FC6-453F-B12C-D200E759695D}"/>
+              </a:ext>
+            </a:extLst>
+          </p:cNvPr>
+          <p:cNvSpPr>
+            <a:spLocks noGrp="1"/>
+          </p:cNvSpPr>
+          <p:nvPr>
+            <p:ph idx="1"/>
+          </p:nvPr>
+        </p:nvSpPr>
+        <p:spPr>
+          <a:xfrm>
+            <a:off x="1069848" y="2121408"/>
+            <a:ext cx="10058400" cy="1122124"/>
+          </a:xfrm>
+        </p:spPr>
+        <p:txBody>
+          <a:bodyPr/>
+          <a:lstStyle/>
+          <a:p>
+            <a:r>
+              <a:rPr lang="hu-HU" dirty="0"/>
+              <a:t>Decision </a:t>
+            </a:r>
+            <a:r>
+              <a:rPr lang="hu-HU" dirty="0" err="1"/>
+              <a:t>tree</a:t>
+            </a:r>
+            <a:endParaRPr lang="hu-HU" dirty="0"/>
+          </a:p>
+          <a:p>
+            <a:r>
+              <a:rPr lang="hu-HU" dirty="0"/>
+              <a:t>SVR modell (</a:t>
+            </a:r>
+            <a:r>
+              <a:rPr lang="hu-HU" dirty="0" err="1"/>
+              <a:t>support</a:t>
+            </a:r>
+            <a:r>
+              <a:rPr lang="hu-HU" dirty="0"/>
+              <a:t> </a:t>
+            </a:r>
+            <a:r>
+              <a:rPr lang="hu-HU" dirty="0" err="1"/>
+              <a:t>vector</a:t>
+            </a:r>
+            <a:r>
+              <a:rPr lang="hu-HU" dirty="0"/>
+              <a:t> </a:t>
+            </a:r>
+            <a:r>
+              <a:rPr lang="hu-HU" dirty="0" err="1"/>
+              <a:t>regression</a:t>
+            </a:r>
+            <a:r>
+              <a:rPr lang="hu-HU" dirty="0"/>
+              <a:t>)</a:t>
+            </a:r>
+          </a:p>
+        </p:txBody>
+      </p:sp>
+    </p:spTree>
+    <p:extLst>
+      <p:ext uri="{BB962C8B-B14F-4D97-AF65-F5344CB8AC3E}">
+        <p14:creationId xmlns:p14="http://schemas.microsoft.com/office/powerpoint/2010/main" val="1629380740"/>
+      </p:ext>
+    </p:extLst>
+  </p:cSld>
+  <p:clrMapOvr>
+    <a:masterClrMapping/>
+  </p:clrMapOvr>
+</p:sld>
+</file>
+
+<file path=ppt/slides/slide21.xml><?xml version="1.0" encoding="utf-8"?>
+<p:sld xmlns:a="http://schemas.openxmlformats.org/drawingml/2006/main" xmlns:r="http://schemas.openxmlformats.org/officeDocument/2006/relationships" xmlns:p="http://schemas.openxmlformats.org/presentationml/2006/main">
+  <p:cSld>
+    <p:spTree>
+      <p:nvGrpSpPr>
+        <p:cNvPr id="1" name=""/>
+        <p:cNvGrpSpPr/>
+        <p:nvPr/>
+      </p:nvGrpSpPr>
+      <p:grpSpPr>
+        <a:xfrm>
+          <a:off x="0" y="0"/>
+          <a:ext cx="0" cy="0"/>
+          <a:chOff x="0" y="0"/>
+          <a:chExt cx="0" cy="0"/>
+        </a:xfrm>
+      </p:grpSpPr>
+      <p:sp>
+        <p:nvSpPr>
+          <p:cNvPr id="2" name="Cím 1">
+            <a:extLst>
+              <a:ext uri="{FF2B5EF4-FFF2-40B4-BE49-F238E27FC236}">
+                <a16:creationId xmlns:a16="http://schemas.microsoft.com/office/drawing/2014/main" id="{9850C8A6-A734-41A1-8385-26DE64532CE0}"/>
+              </a:ext>
+            </a:extLst>
+          </p:cNvPr>
+          <p:cNvSpPr>
+            <a:spLocks noGrp="1"/>
+          </p:cNvSpPr>
+          <p:nvPr>
+            <p:ph type="title"/>
+          </p:nvPr>
+        </p:nvSpPr>
+        <p:spPr/>
+        <p:txBody>
+          <a:bodyPr/>
+          <a:lstStyle/>
+          <a:p>
+            <a:r>
+              <a:rPr lang="hu-HU" dirty="0"/>
+              <a:t>Decision </a:t>
+            </a:r>
+            <a:r>
+              <a:rPr lang="hu-HU" dirty="0" err="1"/>
+              <a:t>tree</a:t>
+            </a:r>
+            <a:r>
+              <a:rPr lang="hu-HU" dirty="0"/>
+              <a:t> modell</a:t>
+            </a:r>
+          </a:p>
+        </p:txBody>
+      </p:sp>
+      <p:graphicFrame>
+        <p:nvGraphicFramePr>
+          <p:cNvPr id="4" name="Táblázat 6">
+            <a:extLst>
+              <a:ext uri="{FF2B5EF4-FFF2-40B4-BE49-F238E27FC236}">
+                <a16:creationId xmlns:a16="http://schemas.microsoft.com/office/drawing/2014/main" id="{84C0E029-795A-4970-B0CB-814260B4DE12}"/>
+              </a:ext>
+            </a:extLst>
+          </p:cNvPr>
+          <p:cNvGraphicFramePr>
+            <a:graphicFrameLocks noGrp="1"/>
+          </p:cNvGraphicFramePr>
+          <p:nvPr>
+            <p:ph idx="1"/>
+            <p:extLst>
+              <p:ext uri="{D42A27DB-BD31-4B8C-83A1-F6EECF244321}">
+                <p14:modId xmlns:p14="http://schemas.microsoft.com/office/powerpoint/2010/main" val="4114913663"/>
+              </p:ext>
+            </p:extLst>
+          </p:nvPr>
+        </p:nvGraphicFramePr>
+        <p:xfrm>
+          <a:off x="1063752" y="1788857"/>
+          <a:ext cx="9364133" cy="5069143"/>
+        </p:xfrm>
+        <a:graphic>
+          <a:graphicData uri="http://schemas.openxmlformats.org/drawingml/2006/table">
+            <a:tbl>
+              <a:tblPr firstRow="1" bandRow="1">
+                <a:tableStyleId>{5C22544A-7EE6-4342-B048-85BDC9FD1C3A}</a:tableStyleId>
+              </a:tblPr>
+              <a:tblGrid>
+                <a:gridCol w="1872826">
+                  <a:extLst>
+                    <a:ext uri="{9D8B030D-6E8A-4147-A177-3AD203B41FA5}">
+                      <a16:colId xmlns:a16="http://schemas.microsoft.com/office/drawing/2014/main" val="924686332"/>
+                    </a:ext>
+                  </a:extLst>
+                </a:gridCol>
+                <a:gridCol w="1297710">
+                  <a:extLst>
+                    <a:ext uri="{9D8B030D-6E8A-4147-A177-3AD203B41FA5}">
+                      <a16:colId xmlns:a16="http://schemas.microsoft.com/office/drawing/2014/main" val="69668665"/>
+                    </a:ext>
+                  </a:extLst>
+                </a:gridCol>
+                <a:gridCol w="1990800">
+                  <a:extLst>
+                    <a:ext uri="{9D8B030D-6E8A-4147-A177-3AD203B41FA5}">
+                      <a16:colId xmlns:a16="http://schemas.microsoft.com/office/drawing/2014/main" val="240689501"/>
+                    </a:ext>
+                  </a:extLst>
+                </a:gridCol>
+                <a:gridCol w="1548400">
+                  <a:extLst>
+                    <a:ext uri="{9D8B030D-6E8A-4147-A177-3AD203B41FA5}">
+                      <a16:colId xmlns:a16="http://schemas.microsoft.com/office/drawing/2014/main" val="2222998770"/>
+                    </a:ext>
+                  </a:extLst>
+                </a:gridCol>
+                <a:gridCol w="2654397">
+                  <a:extLst>
+                    <a:ext uri="{9D8B030D-6E8A-4147-A177-3AD203B41FA5}">
+                      <a16:colId xmlns:a16="http://schemas.microsoft.com/office/drawing/2014/main" val="125975561"/>
+                    </a:ext>
+                  </a:extLst>
+                </a:gridCol>
+              </a:tblGrid>
+              <a:tr h="714707">
+                <a:tc>
+                  <a:txBody>
+                    <a:bodyPr/>
+                    <a:lstStyle/>
+                    <a:p>
+                      <a:r>
+                        <a:rPr lang="hu-HU" dirty="0"/>
+                        <a:t>Modell</a:t>
+                      </a:r>
+                    </a:p>
+                  </a:txBody>
+                  <a:tcPr/>
+                </a:tc>
+                <a:tc>
+                  <a:txBody>
+                    <a:bodyPr/>
+                    <a:lstStyle/>
+                    <a:p>
+                      <a:r>
+                        <a:rPr lang="hu-HU" dirty="0" err="1"/>
+                        <a:t>Train</a:t>
+                      </a:r>
+                      <a:r>
+                        <a:rPr lang="hu-HU" dirty="0"/>
+                        <a:t> </a:t>
+                      </a:r>
+                      <a:r>
+                        <a:rPr lang="hu-HU" dirty="0" err="1"/>
+                        <a:t>score</a:t>
+                      </a:r>
+                      <a:endParaRPr lang="hu-HU" dirty="0"/>
+                    </a:p>
+                  </a:txBody>
+                  <a:tcPr/>
+                </a:tc>
+                <a:tc>
+                  <a:txBody>
+                    <a:bodyPr/>
+                    <a:lstStyle/>
+                    <a:p>
+                      <a:r>
+                        <a:rPr lang="hu-HU" dirty="0"/>
+                        <a:t>Validációs </a:t>
+                      </a:r>
+                      <a:r>
+                        <a:rPr lang="hu-HU" dirty="0" err="1"/>
+                        <a:t>score</a:t>
+                      </a:r>
+                      <a:endParaRPr lang="hu-HU" dirty="0"/>
+                    </a:p>
+                  </a:txBody>
+                  <a:tcPr/>
+                </a:tc>
+                <a:tc>
+                  <a:txBody>
+                    <a:bodyPr/>
+                    <a:lstStyle/>
+                    <a:p>
+                      <a:r>
+                        <a:rPr lang="hu-HU" dirty="0"/>
+                        <a:t>Teszt </a:t>
+                      </a:r>
+                      <a:r>
+                        <a:rPr lang="hu-HU" dirty="0" err="1"/>
+                        <a:t>score</a:t>
+                      </a:r>
+                      <a:endParaRPr lang="hu-HU" dirty="0"/>
+                    </a:p>
+                  </a:txBody>
+                  <a:tcPr/>
+                </a:tc>
+                <a:tc>
+                  <a:txBody>
+                    <a:bodyPr/>
+                    <a:lstStyle/>
+                    <a:p>
+                      <a:r>
+                        <a:rPr lang="hu-HU" dirty="0"/>
+                        <a:t>Legjobb paraméter</a:t>
+                      </a:r>
+                    </a:p>
+                  </a:txBody>
+                  <a:tcPr/>
+                </a:tc>
+                <a:extLst>
+                  <a:ext uri="{0D108BD9-81ED-4DB2-BD59-A6C34878D82A}">
+                    <a16:rowId xmlns:a16="http://schemas.microsoft.com/office/drawing/2014/main" val="2168541060"/>
+                  </a:ext>
+                </a:extLst>
+              </a:tr>
+              <a:tr h="691949">
+                <a:tc>
+                  <a:txBody>
+                    <a:bodyPr/>
+                    <a:lstStyle/>
+                    <a:p>
+                      <a:pPr algn="l"/>
+                      <a:r>
+                        <a:rPr lang="hu-HU" dirty="0"/>
+                        <a:t>Sima Decision </a:t>
+                      </a:r>
+                      <a:r>
+                        <a:rPr lang="hu-HU" dirty="0" err="1"/>
+                        <a:t>tree</a:t>
+                      </a:r>
+                      <a:endParaRPr lang="hu-HU" dirty="0"/>
+                    </a:p>
+                  </a:txBody>
+                  <a:tcPr/>
+                </a:tc>
+                <a:tc>
+                  <a:txBody>
+                    <a:bodyPr/>
+                    <a:lstStyle/>
+                    <a:p>
+                      <a:pPr algn="l"/>
+                      <a:r>
+                        <a:rPr lang="hu-HU" dirty="0">
+                          <a:effectLst/>
+                        </a:rPr>
+                        <a:t>0.0354</a:t>
+                      </a:r>
+                    </a:p>
+                  </a:txBody>
+                  <a:tcPr anchor="ctr"/>
+                </a:tc>
+                <a:tc>
+                  <a:txBody>
+                    <a:bodyPr/>
+                    <a:lstStyle/>
+                    <a:p>
+                      <a:pPr algn="l"/>
+                      <a:r>
+                        <a:rPr lang="hu-HU" dirty="0"/>
+                        <a:t>0.030549</a:t>
+                      </a:r>
+                    </a:p>
+                  </a:txBody>
+                  <a:tcPr/>
+                </a:tc>
+                <a:tc>
+                  <a:txBody>
+                    <a:bodyPr/>
+                    <a:lstStyle/>
+                    <a:p>
+                      <a:pPr algn="l"/>
+                      <a:r>
+                        <a:rPr lang="hu-HU" dirty="0"/>
+                        <a:t>0.035904</a:t>
+                      </a:r>
+                    </a:p>
+                  </a:txBody>
+                  <a:tcPr/>
+                </a:tc>
+                <a:tc>
+                  <a:txBody>
+                    <a:bodyPr/>
+                    <a:lstStyle/>
+                    <a:p>
+                      <a:pPr algn="l"/>
+                      <a:r>
+                        <a:rPr lang="hu-HU" dirty="0">
+                          <a:effectLst/>
+                        </a:rPr>
+                        <a:t>Min_samples_leaf:0.05</a:t>
+                      </a:r>
+                    </a:p>
+                    <a:p>
+                      <a:pPr algn="l"/>
+                      <a:r>
+                        <a:rPr lang="hu-HU" dirty="0" err="1">
+                          <a:effectLst/>
+                        </a:rPr>
+                        <a:t>Max_depth</a:t>
+                      </a:r>
+                      <a:r>
+                        <a:rPr lang="hu-HU" dirty="0">
+                          <a:effectLst/>
+                        </a:rPr>
+                        <a:t>: 6</a:t>
+                      </a:r>
+                    </a:p>
+                  </a:txBody>
+                  <a:tcPr anchor="ctr"/>
+                </a:tc>
+                <a:extLst>
+                  <a:ext uri="{0D108BD9-81ED-4DB2-BD59-A6C34878D82A}">
+                    <a16:rowId xmlns:a16="http://schemas.microsoft.com/office/drawing/2014/main" val="484246718"/>
+                  </a:ext>
+                </a:extLst>
+              </a:tr>
+              <a:tr h="833280">
+                <a:tc>
+                  <a:txBody>
+                    <a:bodyPr/>
+                    <a:lstStyle/>
+                    <a:p>
+                      <a:pPr algn="l"/>
+                      <a:r>
+                        <a:rPr lang="hu-HU" dirty="0"/>
+                        <a:t>Decision </a:t>
+                      </a:r>
+                      <a:r>
+                        <a:rPr lang="hu-HU" dirty="0" err="1"/>
+                        <a:t>tre</a:t>
+                      </a:r>
+                      <a:r>
+                        <a:rPr lang="hu-HU" dirty="0"/>
+                        <a:t> </a:t>
+                      </a:r>
+                      <a:r>
+                        <a:rPr lang="hu-HU" dirty="0" err="1"/>
+                        <a:t>pca-val</a:t>
+                      </a:r>
+                      <a:r>
+                        <a:rPr lang="hu-HU" dirty="0"/>
+                        <a:t> csökkentetten</a:t>
+                      </a:r>
+                    </a:p>
+                  </a:txBody>
+                  <a:tcPr/>
+                </a:tc>
+                <a:tc>
+                  <a:txBody>
+                    <a:bodyPr/>
+                    <a:lstStyle/>
+                    <a:p>
+                      <a:pPr algn="l"/>
+                      <a:r>
+                        <a:rPr lang="hu-HU" dirty="0"/>
+                        <a:t>0.998</a:t>
+                      </a:r>
+                    </a:p>
+                  </a:txBody>
+                  <a:tcPr/>
+                </a:tc>
+                <a:tc>
+                  <a:txBody>
+                    <a:bodyPr/>
+                    <a:lstStyle/>
+                    <a:p>
+                      <a:pPr algn="l"/>
+                      <a:r>
+                        <a:rPr lang="hu-HU" dirty="0"/>
+                        <a:t>0.111206</a:t>
+                      </a:r>
+                    </a:p>
+                  </a:txBody>
+                  <a:tcPr/>
+                </a:tc>
+                <a:tc>
+                  <a:txBody>
+                    <a:bodyPr/>
+                    <a:lstStyle/>
+                    <a:p>
+                      <a:pPr algn="l"/>
+                      <a:r>
+                        <a:rPr lang="hu-HU" dirty="0"/>
+                        <a:t>0.10216</a:t>
+                      </a:r>
+                    </a:p>
+                  </a:txBody>
+                  <a:tcPr/>
+                </a:tc>
+                <a:tc>
+                  <a:txBody>
+                    <a:bodyPr/>
+                    <a:lstStyle/>
+                    <a:p>
+                      <a:pPr algn="l"/>
+                      <a:r>
+                        <a:rPr lang="hu-HU" dirty="0">
+                          <a:effectLst/>
+                        </a:rPr>
+                        <a:t>Min_samples_leaf:0.05</a:t>
+                      </a:r>
+                    </a:p>
+                    <a:p>
+                      <a:pPr algn="l"/>
+                      <a:r>
+                        <a:rPr lang="hu-HU" dirty="0" err="1">
+                          <a:effectLst/>
+                        </a:rPr>
+                        <a:t>Max_depth</a:t>
+                      </a:r>
+                      <a:r>
+                        <a:rPr lang="hu-HU" dirty="0">
+                          <a:effectLst/>
+                        </a:rPr>
+                        <a:t>: 7</a:t>
+                      </a:r>
+                    </a:p>
+                  </a:txBody>
+                  <a:tcPr/>
+                </a:tc>
+                <a:extLst>
+                  <a:ext uri="{0D108BD9-81ED-4DB2-BD59-A6C34878D82A}">
+                    <a16:rowId xmlns:a16="http://schemas.microsoft.com/office/drawing/2014/main" val="405428028"/>
+                  </a:ext>
+                </a:extLst>
+              </a:tr>
+              <a:tr h="1285047">
+                <a:tc>
+                  <a:txBody>
+                    <a:bodyPr/>
+                    <a:lstStyle/>
+                    <a:p>
+                      <a:pPr algn="l"/>
+                      <a:r>
+                        <a:rPr lang="hu-HU" dirty="0"/>
+                        <a:t>Decision </a:t>
+                      </a:r>
+                      <a:r>
+                        <a:rPr lang="hu-HU" dirty="0" err="1"/>
+                        <a:t>tree</a:t>
+                      </a:r>
+                      <a:r>
+                        <a:rPr lang="hu-HU" dirty="0"/>
+                        <a:t> </a:t>
+                      </a:r>
+                      <a:r>
+                        <a:rPr lang="hu-HU" dirty="0" err="1"/>
+                        <a:t>svd</a:t>
+                      </a:r>
+                      <a:r>
+                        <a:rPr lang="hu-HU" dirty="0"/>
+                        <a:t>-vel</a:t>
+                      </a:r>
+                    </a:p>
+                    <a:p>
+                      <a:pPr algn="l"/>
+                      <a:r>
+                        <a:rPr lang="hu-HU" dirty="0"/>
+                        <a:t>csökkentetten</a:t>
+                      </a:r>
+                    </a:p>
+                  </a:txBody>
+                  <a:tcPr/>
+                </a:tc>
+                <a:tc>
+                  <a:txBody>
+                    <a:bodyPr/>
+                    <a:lstStyle/>
+                    <a:p>
+                      <a:pPr algn="l"/>
+                      <a:r>
+                        <a:rPr lang="hu-HU" dirty="0"/>
+                        <a:t>0.172</a:t>
+                      </a:r>
+                    </a:p>
+                  </a:txBody>
+                  <a:tcPr/>
+                </a:tc>
+                <a:tc>
+                  <a:txBody>
+                    <a:bodyPr/>
+                    <a:lstStyle/>
+                    <a:p>
+                      <a:pPr algn="l"/>
+                      <a:r>
+                        <a:rPr lang="hu-HU" dirty="0"/>
+                        <a:t>0.13875</a:t>
+                      </a:r>
+                    </a:p>
+                  </a:txBody>
+                  <a:tcPr/>
+                </a:tc>
+                <a:tc>
+                  <a:txBody>
+                    <a:bodyPr/>
+                    <a:lstStyle/>
+                    <a:p>
+                      <a:pPr algn="l"/>
+                      <a:r>
+                        <a:rPr lang="hu-HU" dirty="0"/>
+                        <a:t>0.1032</a:t>
+                      </a:r>
+                    </a:p>
+                  </a:txBody>
+                  <a:tcPr/>
+                </a:tc>
+                <a:tc>
+                  <a:txBody>
+                    <a:bodyPr/>
+                    <a:lstStyle/>
+                    <a:p>
+                      <a:pPr algn="l"/>
+                      <a:r>
+                        <a:rPr lang="hu-HU" dirty="0" err="1"/>
+                        <a:t>Min_samples_leaf</a:t>
+                      </a:r>
+                      <a:r>
+                        <a:rPr lang="hu-HU" dirty="0"/>
+                        <a:t>: 0.05</a:t>
+                      </a:r>
+                    </a:p>
+                    <a:p>
+                      <a:pPr algn="l"/>
+                      <a:r>
+                        <a:rPr lang="hu-HU" dirty="0" err="1"/>
+                        <a:t>Max_depth</a:t>
+                      </a:r>
+                      <a:r>
+                        <a:rPr lang="hu-HU" dirty="0"/>
+                        <a:t>:  7</a:t>
+                      </a:r>
+                    </a:p>
+                  </a:txBody>
+                  <a:tcPr/>
+                </a:tc>
+                <a:extLst>
+                  <a:ext uri="{0D108BD9-81ED-4DB2-BD59-A6C34878D82A}">
+                    <a16:rowId xmlns:a16="http://schemas.microsoft.com/office/drawing/2014/main" val="2352072354"/>
+                  </a:ext>
+                </a:extLst>
+              </a:tr>
+              <a:tr h="1333247">
+                <a:tc>
+                  <a:txBody>
+                    <a:bodyPr/>
+                    <a:lstStyle/>
+                    <a:p>
+                      <a:pPr algn="l"/>
+                      <a:r>
+                        <a:rPr lang="hu-HU" dirty="0"/>
+                        <a:t>Decision </a:t>
+                      </a:r>
+                      <a:r>
+                        <a:rPr lang="hu-HU" dirty="0" err="1"/>
+                        <a:t>tree</a:t>
+                      </a:r>
+                      <a:r>
+                        <a:rPr lang="hu-HU" dirty="0"/>
+                        <a:t> </a:t>
+                      </a:r>
+                      <a:r>
+                        <a:rPr lang="hu-HU" dirty="0" err="1"/>
+                        <a:t>svd</a:t>
+                      </a:r>
+                      <a:r>
+                        <a:rPr lang="hu-HU" dirty="0"/>
+                        <a:t>-vel </a:t>
+                      </a:r>
+                      <a:r>
+                        <a:rPr lang="hu-HU" dirty="0" err="1"/>
+                        <a:t>csökkenteve</a:t>
+                      </a:r>
+                      <a:r>
+                        <a:rPr lang="hu-HU" dirty="0"/>
+                        <a:t>(</a:t>
+                      </a:r>
+                      <a:r>
+                        <a:rPr lang="hu-HU" dirty="0" err="1"/>
+                        <a:t>sample_leaf_csökkentve</a:t>
+                      </a:r>
+                      <a:r>
+                        <a:rPr lang="hu-HU" dirty="0"/>
+                        <a:t>)</a:t>
+                      </a:r>
+                    </a:p>
+                  </a:txBody>
+                  <a:tcPr/>
+                </a:tc>
+                <a:tc>
+                  <a:txBody>
+                    <a:bodyPr/>
+                    <a:lstStyle/>
+                    <a:p>
+                      <a:pPr algn="l"/>
+                      <a:r>
+                        <a:rPr lang="hu-HU" dirty="0"/>
+                        <a:t>0.991431</a:t>
+                      </a:r>
+                    </a:p>
+                  </a:txBody>
+                  <a:tcPr/>
+                </a:tc>
+                <a:tc>
+                  <a:txBody>
+                    <a:bodyPr/>
+                    <a:lstStyle/>
+                    <a:p>
+                      <a:pPr marL="0" marR="0" lvl="0" indent="0" algn="l" defTabSz="914400" rtl="0" eaLnBrk="1" fontAlgn="auto" latinLnBrk="0" hangingPunct="1">
+                        <a:lnSpc>
+                          <a:spcPct val="100000"/>
+                        </a:lnSpc>
+                        <a:spcBef>
+                          <a:spcPts val="0"/>
+                        </a:spcBef>
+                        <a:spcAft>
+                          <a:spcPts val="0"/>
+                        </a:spcAft>
+                        <a:buClrTx/>
+                        <a:buSzTx/>
+                        <a:buFontTx/>
+                        <a:buNone/>
+                        <a:tabLst/>
+                        <a:defRPr/>
+                      </a:pPr>
+                      <a:r>
+                        <a:rPr lang="hu-HU" dirty="0"/>
+                        <a:t>0.966945</a:t>
+                      </a:r>
+                    </a:p>
+                  </a:txBody>
+                  <a:tcPr/>
+                </a:tc>
+                <a:tc>
+                  <a:txBody>
+                    <a:bodyPr/>
+                    <a:lstStyle/>
+                    <a:p>
+                      <a:pPr algn="l"/>
+                      <a:r>
+                        <a:rPr lang="hu-HU" dirty="0"/>
+                        <a:t>0.952349</a:t>
+                      </a:r>
+                    </a:p>
+                  </a:txBody>
+                  <a:tcPr/>
+                </a:tc>
+                <a:tc>
+                  <a:txBody>
+                    <a:bodyPr/>
+                    <a:lstStyle/>
+                    <a:p>
+                      <a:pPr algn="l"/>
+                      <a:r>
+                        <a:rPr lang="hu-HU" dirty="0" err="1"/>
+                        <a:t>Min_samples_leaf</a:t>
+                      </a:r>
+                      <a:r>
+                        <a:rPr lang="hu-HU" dirty="0"/>
+                        <a:t>: 0.001</a:t>
+                      </a:r>
+                    </a:p>
+                    <a:p>
+                      <a:pPr algn="l"/>
+                      <a:r>
+                        <a:rPr lang="hu-HU" dirty="0" err="1"/>
+                        <a:t>Max_depth</a:t>
+                      </a:r>
+                      <a:r>
+                        <a:rPr lang="hu-HU" dirty="0"/>
+                        <a:t>:  7</a:t>
+                      </a:r>
+                    </a:p>
+                    <a:p>
+                      <a:pPr algn="l"/>
+                      <a:endParaRPr lang="hu-HU" dirty="0"/>
+                    </a:p>
+                  </a:txBody>
+                  <a:tcPr/>
+                </a:tc>
+                <a:extLst>
+                  <a:ext uri="{0D108BD9-81ED-4DB2-BD59-A6C34878D82A}">
+                    <a16:rowId xmlns:a16="http://schemas.microsoft.com/office/drawing/2014/main" val="75268478"/>
+                  </a:ext>
+                </a:extLst>
+              </a:tr>
+            </a:tbl>
+          </a:graphicData>
+        </a:graphic>
+      </p:graphicFrame>
+    </p:spTree>
+    <p:extLst>
+      <p:ext uri="{BB962C8B-B14F-4D97-AF65-F5344CB8AC3E}">
+        <p14:creationId xmlns:p14="http://schemas.microsoft.com/office/powerpoint/2010/main" val="3045788944"/>
+      </p:ext>
+    </p:extLst>
+  </p:cSld>
+  <p:clrMapOvr>
+    <a:masterClrMapping/>
+  </p:clrMapOvr>
+</p:sld>
+</file>
+
+<file path=ppt/slides/slide22.xml><?xml version="1.0" encoding="utf-8"?>
+<p:sld xmlns:a="http://schemas.openxmlformats.org/drawingml/2006/main" xmlns:r="http://schemas.openxmlformats.org/officeDocument/2006/relationships" xmlns:p="http://schemas.openxmlformats.org/presentationml/2006/main">
+  <p:cSld>
+    <p:spTree>
+      <p:nvGrpSpPr>
+        <p:cNvPr id="1" name=""/>
+        <p:cNvGrpSpPr/>
+        <p:nvPr/>
+      </p:nvGrpSpPr>
+      <p:grpSpPr>
+        <a:xfrm>
+          <a:off x="0" y="0"/>
+          <a:ext cx="0" cy="0"/>
+          <a:chOff x="0" y="0"/>
+          <a:chExt cx="0" cy="0"/>
+        </a:xfrm>
+      </p:grpSpPr>
+      <p:sp>
+        <p:nvSpPr>
+          <p:cNvPr id="2" name="Cím 1">
+            <a:extLst>
+              <a:ext uri="{FF2B5EF4-FFF2-40B4-BE49-F238E27FC236}">
+                <a16:creationId xmlns:a16="http://schemas.microsoft.com/office/drawing/2014/main" id="{FA4C3067-BBED-4A3A-9C95-78AD1A9F7A8E}"/>
+              </a:ext>
+            </a:extLst>
+          </p:cNvPr>
+          <p:cNvSpPr>
+            <a:spLocks noGrp="1"/>
+          </p:cNvSpPr>
+          <p:nvPr>
+            <p:ph type="title"/>
+          </p:nvPr>
+        </p:nvSpPr>
+        <p:spPr>
+          <a:xfrm>
+            <a:off x="1066800" y="167601"/>
+            <a:ext cx="10058400" cy="1609344"/>
+          </a:xfrm>
+        </p:spPr>
+        <p:txBody>
+          <a:bodyPr/>
+          <a:lstStyle/>
+          <a:p>
+            <a:r>
+              <a:rPr lang="hu-HU" dirty="0"/>
+              <a:t>SVR modell</a:t>
+            </a:r>
+          </a:p>
+        </p:txBody>
+      </p:sp>
+      <p:graphicFrame>
+        <p:nvGraphicFramePr>
+          <p:cNvPr id="4" name="Táblázat 6">
+            <a:extLst>
+              <a:ext uri="{FF2B5EF4-FFF2-40B4-BE49-F238E27FC236}">
+                <a16:creationId xmlns:a16="http://schemas.microsoft.com/office/drawing/2014/main" id="{34C865EE-0CD1-4D48-A11B-F7586A7D1802}"/>
+              </a:ext>
+            </a:extLst>
+          </p:cNvPr>
+          <p:cNvGraphicFramePr>
+            <a:graphicFrameLocks noGrp="1"/>
+          </p:cNvGraphicFramePr>
+          <p:nvPr>
+            <p:ph idx="1"/>
+            <p:extLst>
+              <p:ext uri="{D42A27DB-BD31-4B8C-83A1-F6EECF244321}">
+                <p14:modId xmlns:p14="http://schemas.microsoft.com/office/powerpoint/2010/main" val="3951906025"/>
+              </p:ext>
+            </p:extLst>
+          </p:nvPr>
+        </p:nvGraphicFramePr>
+        <p:xfrm>
+          <a:off x="757881" y="1993557"/>
+          <a:ext cx="8618536" cy="3198394"/>
+        </p:xfrm>
+        <a:graphic>
+          <a:graphicData uri="http://schemas.openxmlformats.org/drawingml/2006/table">
+            <a:tbl>
+              <a:tblPr firstRow="1" bandRow="1">
+                <a:tableStyleId>{5C22544A-7EE6-4342-B048-85BDC9FD1C3A}</a:tableStyleId>
+              </a:tblPr>
+              <a:tblGrid>
+                <a:gridCol w="1723707">
+                  <a:extLst>
+                    <a:ext uri="{9D8B030D-6E8A-4147-A177-3AD203B41FA5}">
+                      <a16:colId xmlns:a16="http://schemas.microsoft.com/office/drawing/2014/main" val="924686332"/>
+                    </a:ext>
+                  </a:extLst>
+                </a:gridCol>
+                <a:gridCol w="1194383">
+                  <a:extLst>
+                    <a:ext uri="{9D8B030D-6E8A-4147-A177-3AD203B41FA5}">
+                      <a16:colId xmlns:a16="http://schemas.microsoft.com/office/drawing/2014/main" val="69668665"/>
+                    </a:ext>
+                  </a:extLst>
+                </a:gridCol>
+                <a:gridCol w="1832287">
+                  <a:extLst>
+                    <a:ext uri="{9D8B030D-6E8A-4147-A177-3AD203B41FA5}">
+                      <a16:colId xmlns:a16="http://schemas.microsoft.com/office/drawing/2014/main" val="240689501"/>
+                    </a:ext>
+                  </a:extLst>
+                </a:gridCol>
+                <a:gridCol w="1425112">
+                  <a:extLst>
+                    <a:ext uri="{9D8B030D-6E8A-4147-A177-3AD203B41FA5}">
+                      <a16:colId xmlns:a16="http://schemas.microsoft.com/office/drawing/2014/main" val="2222998770"/>
+                    </a:ext>
+                  </a:extLst>
+                </a:gridCol>
+                <a:gridCol w="2443047">
+                  <a:extLst>
+                    <a:ext uri="{9D8B030D-6E8A-4147-A177-3AD203B41FA5}">
+                      <a16:colId xmlns:a16="http://schemas.microsoft.com/office/drawing/2014/main" val="125975561"/>
+                    </a:ext>
+                  </a:extLst>
+                </a:gridCol>
+              </a:tblGrid>
+              <a:tr h="675576">
+                <a:tc>
+                  <a:txBody>
+                    <a:bodyPr/>
+                    <a:lstStyle/>
+                    <a:p>
+                      <a:r>
+                        <a:rPr lang="hu-HU" dirty="0"/>
+                        <a:t>Modell</a:t>
+                      </a:r>
+                    </a:p>
+                  </a:txBody>
+                  <a:tcPr/>
+                </a:tc>
+                <a:tc>
+                  <a:txBody>
+                    <a:bodyPr/>
+                    <a:lstStyle/>
+                    <a:p>
+                      <a:r>
+                        <a:rPr lang="hu-HU" dirty="0" err="1"/>
+                        <a:t>Train</a:t>
+                      </a:r>
+                      <a:r>
+                        <a:rPr lang="hu-HU" dirty="0"/>
+                        <a:t> </a:t>
+                      </a:r>
+                      <a:r>
+                        <a:rPr lang="hu-HU" dirty="0" err="1"/>
+                        <a:t>score</a:t>
+                      </a:r>
+                      <a:endParaRPr lang="hu-HU" dirty="0"/>
+                    </a:p>
+                  </a:txBody>
+                  <a:tcPr/>
+                </a:tc>
+                <a:tc>
+                  <a:txBody>
+                    <a:bodyPr/>
+                    <a:lstStyle/>
+                    <a:p>
+                      <a:r>
+                        <a:rPr lang="hu-HU" dirty="0"/>
+                        <a:t>Validációs </a:t>
+                      </a:r>
+                      <a:r>
+                        <a:rPr lang="hu-HU" dirty="0" err="1"/>
+                        <a:t>score</a:t>
+                      </a:r>
+                      <a:endParaRPr lang="hu-HU" dirty="0"/>
+                    </a:p>
+                  </a:txBody>
+                  <a:tcPr/>
+                </a:tc>
+                <a:tc>
+                  <a:txBody>
+                    <a:bodyPr/>
+                    <a:lstStyle/>
+                    <a:p>
+                      <a:r>
+                        <a:rPr lang="hu-HU" dirty="0"/>
+                        <a:t>Teszt </a:t>
+                      </a:r>
+                      <a:r>
+                        <a:rPr lang="hu-HU" dirty="0" err="1"/>
+                        <a:t>score</a:t>
+                      </a:r>
+                      <a:endParaRPr lang="hu-HU" dirty="0"/>
+                    </a:p>
+                  </a:txBody>
+                  <a:tcPr/>
+                </a:tc>
+                <a:tc>
+                  <a:txBody>
+                    <a:bodyPr/>
+                    <a:lstStyle/>
+                    <a:p>
+                      <a:r>
+                        <a:rPr lang="hu-HU" dirty="0"/>
+                        <a:t>Legjobb paraméter</a:t>
+                      </a:r>
+                    </a:p>
+                  </a:txBody>
+                  <a:tcPr/>
+                </a:tc>
+                <a:extLst>
+                  <a:ext uri="{0D108BD9-81ED-4DB2-BD59-A6C34878D82A}">
+                    <a16:rowId xmlns:a16="http://schemas.microsoft.com/office/drawing/2014/main" val="2168541060"/>
+                  </a:ext>
+                </a:extLst>
+              </a:tr>
+              <a:tr h="654064">
+                <a:tc>
+                  <a:txBody>
+                    <a:bodyPr/>
+                    <a:lstStyle/>
+                    <a:p>
+                      <a:r>
+                        <a:rPr lang="hu-HU" dirty="0"/>
+                        <a:t>Sima SVR</a:t>
+                      </a:r>
+                    </a:p>
+                  </a:txBody>
+                  <a:tcPr/>
+                </a:tc>
+                <a:tc>
+                  <a:txBody>
+                    <a:bodyPr/>
+                    <a:lstStyle/>
+                    <a:p>
+                      <a:pPr algn="r"/>
+                      <a:r>
+                        <a:rPr lang="hu-HU" sz="1800" b="0" i="0" kern="1200" dirty="0">
+                          <a:solidFill>
+                            <a:schemeClr val="dk1"/>
+                          </a:solidFill>
+                          <a:effectLst/>
+                          <a:latin typeface="+mn-lt"/>
+                          <a:ea typeface="+mn-ea"/>
+                          <a:cs typeface="+mn-cs"/>
+                        </a:rPr>
+                        <a:t>0.061517</a:t>
+                      </a:r>
+                      <a:endParaRPr lang="hu-HU" dirty="0">
+                        <a:effectLst/>
+                      </a:endParaRPr>
+                    </a:p>
+                  </a:txBody>
+                  <a:tcPr anchor="ctr"/>
+                </a:tc>
+                <a:tc>
+                  <a:txBody>
+                    <a:bodyPr/>
+                    <a:lstStyle/>
+                    <a:p>
+                      <a:r>
+                        <a:rPr lang="hu-HU" sz="1800" b="0" i="0" kern="1200" dirty="0">
+                          <a:solidFill>
+                            <a:schemeClr val="dk1"/>
+                          </a:solidFill>
+                          <a:effectLst/>
+                          <a:latin typeface="+mn-lt"/>
+                          <a:ea typeface="+mn-ea"/>
+                          <a:cs typeface="+mn-cs"/>
+                        </a:rPr>
+                        <a:t>0.061514</a:t>
+                      </a:r>
+                      <a:endParaRPr lang="hu-HU" dirty="0"/>
+                    </a:p>
+                  </a:txBody>
+                  <a:tcPr/>
+                </a:tc>
+                <a:tc>
+                  <a:txBody>
+                    <a:bodyPr/>
+                    <a:lstStyle/>
+                    <a:p>
+                      <a:r>
+                        <a:rPr lang="hu-HU" dirty="0"/>
+                        <a:t>0.073</a:t>
+                      </a:r>
+                    </a:p>
+                  </a:txBody>
+                  <a:tcPr/>
+                </a:tc>
+                <a:tc>
+                  <a:txBody>
+                    <a:bodyPr/>
+                    <a:lstStyle/>
+                    <a:p>
+                      <a:pPr algn="l"/>
+                      <a:r>
+                        <a:rPr lang="hu-HU" dirty="0">
+                          <a:effectLst/>
+                        </a:rPr>
+                        <a:t>kernel: '</a:t>
+                      </a:r>
+                      <a:r>
+                        <a:rPr lang="hu-HU" dirty="0" err="1">
+                          <a:effectLst/>
+                        </a:rPr>
+                        <a:t>sigmoid</a:t>
+                      </a:r>
+                      <a:r>
+                        <a:rPr lang="hu-HU" dirty="0">
+                          <a:effectLst/>
+                        </a:rPr>
+                        <a:t>’</a:t>
+                      </a:r>
+                    </a:p>
+                    <a:p>
+                      <a:pPr algn="l"/>
+                      <a:r>
+                        <a:rPr lang="hu-HU" dirty="0">
+                          <a:effectLst/>
+                        </a:rPr>
+                        <a:t>'C': 1</a:t>
+                      </a:r>
+                    </a:p>
+                  </a:txBody>
+                  <a:tcPr anchor="ctr"/>
+                </a:tc>
+                <a:extLst>
+                  <a:ext uri="{0D108BD9-81ED-4DB2-BD59-A6C34878D82A}">
+                    <a16:rowId xmlns:a16="http://schemas.microsoft.com/office/drawing/2014/main" val="484246718"/>
+                  </a:ext>
+                </a:extLst>
+              </a:tr>
+              <a:tr h="654064">
+                <a:tc>
+                  <a:txBody>
+                    <a:bodyPr/>
+                    <a:lstStyle/>
+                    <a:p>
+                      <a:r>
+                        <a:rPr lang="hu-HU" dirty="0"/>
+                        <a:t>SVR </a:t>
+                      </a:r>
+                      <a:r>
+                        <a:rPr lang="hu-HU" dirty="0" err="1"/>
+                        <a:t>pca-val</a:t>
+                      </a:r>
+                      <a:r>
+                        <a:rPr lang="hu-HU" dirty="0"/>
+                        <a:t> csökkentetten</a:t>
+                      </a:r>
+                    </a:p>
+                  </a:txBody>
+                  <a:tcPr/>
+                </a:tc>
+                <a:tc>
+                  <a:txBody>
+                    <a:bodyPr/>
+                    <a:lstStyle/>
+                    <a:p>
+                      <a:r>
+                        <a:rPr lang="hu-HU" dirty="0"/>
+                        <a:t>0.998</a:t>
+                      </a:r>
+                    </a:p>
+                  </a:txBody>
+                  <a:tcPr/>
+                </a:tc>
+                <a:tc>
+                  <a:txBody>
+                    <a:bodyPr/>
+                    <a:lstStyle/>
+                    <a:p>
+                      <a:r>
+                        <a:rPr lang="hu-HU" dirty="0"/>
+                        <a:t>0.102819</a:t>
+                      </a:r>
+                    </a:p>
+                  </a:txBody>
+                  <a:tcPr/>
+                </a:tc>
+                <a:tc>
+                  <a:txBody>
+                    <a:bodyPr/>
+                    <a:lstStyle/>
+                    <a:p>
+                      <a:r>
+                        <a:rPr lang="hu-HU" dirty="0"/>
+                        <a:t>0.092</a:t>
+                      </a:r>
+                    </a:p>
+                  </a:txBody>
+                  <a:tcPr/>
+                </a:tc>
+                <a:tc>
+                  <a:txBody>
+                    <a:bodyPr/>
+                    <a:lstStyle/>
+                    <a:p>
+                      <a:r>
+                        <a:rPr lang="hu-HU" dirty="0"/>
+                        <a:t>Kernel: </a:t>
+                      </a:r>
+                      <a:r>
+                        <a:rPr lang="hu-HU" dirty="0" err="1"/>
+                        <a:t>rbf</a:t>
+                      </a:r>
+                      <a:endParaRPr lang="hu-HU" dirty="0"/>
+                    </a:p>
+                    <a:p>
+                      <a:r>
+                        <a:rPr lang="hu-HU" dirty="0"/>
+                        <a:t>C : 2</a:t>
+                      </a:r>
+                    </a:p>
+                  </a:txBody>
+                  <a:tcPr/>
+                </a:tc>
+                <a:extLst>
+                  <a:ext uri="{0D108BD9-81ED-4DB2-BD59-A6C34878D82A}">
+                    <a16:rowId xmlns:a16="http://schemas.microsoft.com/office/drawing/2014/main" val="405428028"/>
+                  </a:ext>
+                </a:extLst>
+              </a:tr>
+              <a:tr h="1214690">
+                <a:tc>
+                  <a:txBody>
+                    <a:bodyPr/>
+                    <a:lstStyle/>
+                    <a:p>
+                      <a:r>
+                        <a:rPr lang="hu-HU" dirty="0"/>
+                        <a:t>SVR </a:t>
+                      </a:r>
+                      <a:r>
+                        <a:rPr lang="hu-HU" dirty="0" err="1"/>
+                        <a:t>svd</a:t>
+                      </a:r>
+                      <a:r>
+                        <a:rPr lang="hu-HU" dirty="0"/>
+                        <a:t>-vel</a:t>
+                      </a:r>
+                    </a:p>
+                    <a:p>
+                      <a:r>
+                        <a:rPr lang="hu-HU" dirty="0"/>
+                        <a:t>csökkentetten</a:t>
+                      </a:r>
+                    </a:p>
+                  </a:txBody>
+                  <a:tcPr/>
+                </a:tc>
+                <a:tc>
+                  <a:txBody>
+                    <a:bodyPr/>
+                    <a:lstStyle/>
+                    <a:p>
+                      <a:r>
+                        <a:rPr lang="hu-HU" dirty="0"/>
+                        <a:t>0.1202</a:t>
+                      </a:r>
+                    </a:p>
+                  </a:txBody>
+                  <a:tcPr/>
+                </a:tc>
+                <a:tc>
+                  <a:txBody>
+                    <a:bodyPr/>
+                    <a:lstStyle/>
+                    <a:p>
+                      <a:r>
+                        <a:rPr lang="hu-HU" dirty="0"/>
+                        <a:t>0.105987</a:t>
+                      </a:r>
+                    </a:p>
+                  </a:txBody>
+                  <a:tcPr/>
+                </a:tc>
+                <a:tc>
+                  <a:txBody>
+                    <a:bodyPr/>
+                    <a:lstStyle/>
+                    <a:p>
+                      <a:r>
+                        <a:rPr lang="hu-HU" dirty="0"/>
+                        <a:t>0.0932</a:t>
+                      </a:r>
+                    </a:p>
+                  </a:txBody>
+                  <a:tcPr/>
+                </a:tc>
+                <a:tc>
+                  <a:txBody>
+                    <a:bodyPr/>
+                    <a:lstStyle/>
+                    <a:p>
+                      <a:r>
+                        <a:rPr lang="hu-HU" dirty="0"/>
+                        <a:t>Kernel: </a:t>
+                      </a:r>
+                      <a:r>
+                        <a:rPr lang="hu-HU" dirty="0" err="1"/>
+                        <a:t>rbf</a:t>
+                      </a:r>
+                      <a:endParaRPr lang="hu-HU" dirty="0"/>
+                    </a:p>
+                    <a:p>
+                      <a:r>
+                        <a:rPr lang="hu-HU" dirty="0"/>
+                        <a:t>C: 2</a:t>
+                      </a:r>
+                    </a:p>
+                  </a:txBody>
+                  <a:tcPr/>
+                </a:tc>
+                <a:extLst>
+                  <a:ext uri="{0D108BD9-81ED-4DB2-BD59-A6C34878D82A}">
+                    <a16:rowId xmlns:a16="http://schemas.microsoft.com/office/drawing/2014/main" val="2352072354"/>
+                  </a:ext>
+                </a:extLst>
+              </a:tr>
+            </a:tbl>
+          </a:graphicData>
+        </a:graphic>
+      </p:graphicFrame>
+    </p:spTree>
+    <p:extLst>
+      <p:ext uri="{BB962C8B-B14F-4D97-AF65-F5344CB8AC3E}">
+        <p14:creationId xmlns:p14="http://schemas.microsoft.com/office/powerpoint/2010/main" val="3447125449"/>
+      </p:ext>
+    </p:extLst>
+  </p:cSld>
+  <p:clrMapOvr>
+    <a:masterClrMapping/>
+  </p:clrMapOvr>
+</p:sld>
+</file>
+
+<file path=ppt/slides/slide23.xml><?xml version="1.0" encoding="utf-8"?>
+<p:sld xmlns:a="http://schemas.openxmlformats.org/drawingml/2006/main" xmlns:r="http://schemas.openxmlformats.org/officeDocument/2006/relationships" xmlns:p="http://schemas.openxmlformats.org/presentationml/2006/main">
+  <p:cSld>
+    <p:bg>
+      <p:bgPr>
+        <a:solidFill>
+          <a:schemeClr val="bg1"/>
+        </a:solidFill>
+        <a:effectLst/>
+      </p:bgPr>
+    </p:bg>
+    <p:spTree>
+      <p:nvGrpSpPr>
+        <p:cNvPr id="1" name=""/>
+        <p:cNvGrpSpPr/>
+        <p:nvPr/>
+      </p:nvGrpSpPr>
+      <p:grpSpPr>
+        <a:xfrm>
+          <a:off x="0" y="0"/>
+          <a:ext cx="0" cy="0"/>
+          <a:chOff x="0" y="0"/>
+          <a:chExt cx="0" cy="0"/>
+        </a:xfrm>
+      </p:grpSpPr>
+      <p:sp>
+        <p:nvSpPr>
+          <p:cNvPr id="2" name="Cím 1">
+            <a:extLst>
+              <a:ext uri="{FF2B5EF4-FFF2-40B4-BE49-F238E27FC236}">
+                <a16:creationId xmlns:a16="http://schemas.microsoft.com/office/drawing/2014/main" id="{DD07E836-AA79-413F-A0B9-DA9BA3F1FBE1}"/>
+              </a:ext>
+            </a:extLst>
+          </p:cNvPr>
+          <p:cNvSpPr>
+            <a:spLocks noGrp="1"/>
+          </p:cNvSpPr>
+          <p:nvPr>
+            <p:ph type="title"/>
+          </p:nvPr>
+        </p:nvSpPr>
+        <p:spPr>
+          <a:xfrm>
+            <a:off x="7865806" y="484632"/>
+            <a:ext cx="3677264" cy="1609344"/>
+          </a:xfrm>
+        </p:spPr>
+        <p:txBody>
+          <a:bodyPr>
+            <a:normAutofit/>
+          </a:bodyPr>
+          <a:lstStyle/>
+          <a:p>
+            <a:r>
+              <a:rPr lang="hu-HU" sz="3600"/>
+              <a:t>Decision tree model</a:t>
+            </a:r>
+          </a:p>
+        </p:txBody>
+      </p:sp>
+      <p:pic>
+        <p:nvPicPr>
+          <p:cNvPr id="5" name="Tartalom helye 4">
+            <a:extLst>
+              <a:ext uri="{FF2B5EF4-FFF2-40B4-BE49-F238E27FC236}">
+                <a16:creationId xmlns:a16="http://schemas.microsoft.com/office/drawing/2014/main" id="{51482E9E-9E61-4A5B-A72A-9B077C772F85}"/>
+              </a:ext>
+            </a:extLst>
+          </p:cNvPr>
+          <p:cNvPicPr>
+            <a:picLocks noChangeAspect="1"/>
+          </p:cNvPicPr>
+          <p:nvPr/>
+        </p:nvPicPr>
+        <p:blipFill>
+          <a:blip r:embed="rId2"/>
+          <a:stretch>
+            <a:fillRect/>
+          </a:stretch>
+        </p:blipFill>
+        <p:spPr>
+          <a:xfrm>
+            <a:off x="633999" y="1146563"/>
+            <a:ext cx="6912217" cy="4575135"/>
+          </a:xfrm>
+          <a:prstGeom prst="rect">
+            <a:avLst/>
+          </a:prstGeom>
+        </p:spPr>
+      </p:pic>
+      <p:sp>
+        <p:nvSpPr>
+          <p:cNvPr id="8" name="Tartalom helye 7">
+            <a:extLst>
+              <a:ext uri="{FF2B5EF4-FFF2-40B4-BE49-F238E27FC236}">
+                <a16:creationId xmlns:a16="http://schemas.microsoft.com/office/drawing/2014/main" id="{5F89400A-5011-4FD9-AAE6-157AB6114362}"/>
+              </a:ext>
+            </a:extLst>
+          </p:cNvPr>
+          <p:cNvSpPr>
+            <a:spLocks noGrp="1"/>
+          </p:cNvSpPr>
+          <p:nvPr>
+            <p:ph idx="1"/>
+          </p:nvPr>
+        </p:nvSpPr>
+        <p:spPr/>
+        <p:txBody>
+          <a:bodyPr/>
+          <a:lstStyle/>
+          <a:p>
+            <a:endParaRPr lang="hu-HU"/>
+          </a:p>
+        </p:txBody>
+      </p:sp>
+    </p:spTree>
+    <p:extLst>
+      <p:ext uri="{BB962C8B-B14F-4D97-AF65-F5344CB8AC3E}">
+        <p14:creationId xmlns:p14="http://schemas.microsoft.com/office/powerpoint/2010/main" val="1801575962"/>
+      </p:ext>
+    </p:extLst>
+  </p:cSld>
+  <p:clrMapOvr>
+    <a:masterClrMapping/>
+  </p:clrMapOvr>
+</p:sld>
+</file>
+
+<file path=ppt/slides/slide24.xml><?xml version="1.0" encoding="utf-8"?>
+<p:sld xmlns:a="http://schemas.openxmlformats.org/drawingml/2006/main" xmlns:r="http://schemas.openxmlformats.org/officeDocument/2006/relationships" xmlns:p="http://schemas.openxmlformats.org/presentationml/2006/main">
+  <p:cSld>
+    <p:bg>
+      <p:bgPr>
+        <a:solidFill>
+          <a:schemeClr val="bg1"/>
+        </a:solidFill>
+        <a:effectLst/>
+      </p:bgPr>
+    </p:bg>
+    <p:spTree>
+      <p:nvGrpSpPr>
+        <p:cNvPr id="1" name=""/>
+        <p:cNvGrpSpPr/>
+        <p:nvPr/>
+      </p:nvGrpSpPr>
+      <p:grpSpPr>
+        <a:xfrm>
+          <a:off x="0" y="0"/>
+          <a:ext cx="0" cy="0"/>
+          <a:chOff x="0" y="0"/>
+          <a:chExt cx="0" cy="0"/>
+        </a:xfrm>
+      </p:grpSpPr>
+      <p:sp>
+        <p:nvSpPr>
+          <p:cNvPr id="2" name="Cím 1">
+            <a:extLst>
+              <a:ext uri="{FF2B5EF4-FFF2-40B4-BE49-F238E27FC236}">
+                <a16:creationId xmlns:a16="http://schemas.microsoft.com/office/drawing/2014/main" id="{E90092EA-D82E-4657-8BD6-6CE9E6BD891D}"/>
+              </a:ext>
+            </a:extLst>
+          </p:cNvPr>
+          <p:cNvSpPr>
+            <a:spLocks noGrp="1"/>
+          </p:cNvSpPr>
+          <p:nvPr>
+            <p:ph type="title"/>
+          </p:nvPr>
+        </p:nvSpPr>
+        <p:spPr>
+          <a:xfrm>
+            <a:off x="7865806" y="484632"/>
+            <a:ext cx="3677264" cy="1609344"/>
+          </a:xfrm>
+        </p:spPr>
+        <p:txBody>
+          <a:bodyPr>
+            <a:normAutofit/>
+          </a:bodyPr>
+          <a:lstStyle/>
+          <a:p>
+            <a:r>
+              <a:rPr lang="hu-HU" sz="3600"/>
+              <a:t>Decision tree model with pca</a:t>
+            </a:r>
+          </a:p>
+        </p:txBody>
+      </p:sp>
+      <p:pic>
+        <p:nvPicPr>
+          <p:cNvPr id="5" name="Tartalom helye 4" descr="A képen szöveg látható&#10;&#10;Automatikusan generált leírás">
+            <a:extLst>
+              <a:ext uri="{FF2B5EF4-FFF2-40B4-BE49-F238E27FC236}">
+                <a16:creationId xmlns:a16="http://schemas.microsoft.com/office/drawing/2014/main" id="{4F6FC846-3856-47EA-8378-463D13C19C67}"/>
+              </a:ext>
+            </a:extLst>
+          </p:cNvPr>
+          <p:cNvPicPr>
+            <a:picLocks noChangeAspect="1"/>
+          </p:cNvPicPr>
+          <p:nvPr/>
+        </p:nvPicPr>
+        <p:blipFill>
+          <a:blip r:embed="rId2"/>
+          <a:stretch>
+            <a:fillRect/>
+          </a:stretch>
+        </p:blipFill>
+        <p:spPr>
+          <a:xfrm>
+            <a:off x="633999" y="1146563"/>
+            <a:ext cx="6863723" cy="4543037"/>
+          </a:xfrm>
+          <a:prstGeom prst="rect">
+            <a:avLst/>
+          </a:prstGeom>
+        </p:spPr>
+      </p:pic>
+      <p:sp>
+        <p:nvSpPr>
+          <p:cNvPr id="7" name="Tartalom helye 6">
+            <a:extLst>
+              <a:ext uri="{FF2B5EF4-FFF2-40B4-BE49-F238E27FC236}">
+                <a16:creationId xmlns:a16="http://schemas.microsoft.com/office/drawing/2014/main" id="{D31966B8-E6C2-4B92-87F1-9C563CF1F1E7}"/>
+              </a:ext>
+            </a:extLst>
+          </p:cNvPr>
+          <p:cNvSpPr>
+            <a:spLocks noGrp="1"/>
+          </p:cNvSpPr>
+          <p:nvPr>
+            <p:ph idx="1"/>
+          </p:nvPr>
+        </p:nvSpPr>
+        <p:spPr/>
+        <p:txBody>
+          <a:bodyPr/>
+          <a:lstStyle/>
+          <a:p>
+            <a:endParaRPr lang="hu-HU"/>
+          </a:p>
+        </p:txBody>
+      </p:sp>
+    </p:spTree>
+    <p:extLst>
+      <p:ext uri="{BB962C8B-B14F-4D97-AF65-F5344CB8AC3E}">
+        <p14:creationId xmlns:p14="http://schemas.microsoft.com/office/powerpoint/2010/main" val="2468280862"/>
+      </p:ext>
+    </p:extLst>
+  </p:cSld>
+  <p:clrMapOvr>
+    <a:masterClrMapping/>
+  </p:clrMapOvr>
+</p:sld>
+</file>
+
+<file path=ppt/slides/slide25.xml><?xml version="1.0" encoding="utf-8"?>
+<p:sld xmlns:a="http://schemas.openxmlformats.org/drawingml/2006/main" xmlns:r="http://schemas.openxmlformats.org/officeDocument/2006/relationships" xmlns:p="http://schemas.openxmlformats.org/presentationml/2006/main">
+  <p:cSld>
+    <p:bg>
+      <p:bgPr>
+        <a:solidFill>
+          <a:schemeClr val="bg1"/>
+        </a:solidFill>
+        <a:effectLst/>
+      </p:bgPr>
+    </p:bg>
+    <p:spTree>
+      <p:nvGrpSpPr>
+        <p:cNvPr id="1" name=""/>
+        <p:cNvGrpSpPr/>
+        <p:nvPr/>
+      </p:nvGrpSpPr>
+      <p:grpSpPr>
+        <a:xfrm>
+          <a:off x="0" y="0"/>
+          <a:ext cx="0" cy="0"/>
+          <a:chOff x="0" y="0"/>
+          <a:chExt cx="0" cy="0"/>
+        </a:xfrm>
+      </p:grpSpPr>
+      <p:sp>
+        <p:nvSpPr>
+          <p:cNvPr id="2" name="Cím 1">
+            <a:extLst>
+              <a:ext uri="{FF2B5EF4-FFF2-40B4-BE49-F238E27FC236}">
+                <a16:creationId xmlns:a16="http://schemas.microsoft.com/office/drawing/2014/main" id="{0D4FA4D5-6A7D-47A3-85B1-8F1A43C87078}"/>
+              </a:ext>
+            </a:extLst>
+          </p:cNvPr>
+          <p:cNvSpPr>
+            <a:spLocks noGrp="1"/>
+          </p:cNvSpPr>
+          <p:nvPr>
+            <p:ph type="title"/>
+          </p:nvPr>
+        </p:nvSpPr>
+        <p:spPr>
+          <a:xfrm>
+            <a:off x="7865806" y="484632"/>
+            <a:ext cx="3677264" cy="1609344"/>
+          </a:xfrm>
+        </p:spPr>
+        <p:txBody>
+          <a:bodyPr>
+            <a:normAutofit/>
+          </a:bodyPr>
+          <a:lstStyle/>
+          <a:p>
+            <a:r>
+              <a:rPr lang="hu-HU" sz="3600"/>
+              <a:t>Decision tree model with svd</a:t>
+            </a:r>
+          </a:p>
+        </p:txBody>
+      </p:sp>
+      <p:pic>
+        <p:nvPicPr>
+          <p:cNvPr id="5" name="Tartalom helye 4">
+            <a:extLst>
+              <a:ext uri="{FF2B5EF4-FFF2-40B4-BE49-F238E27FC236}">
+                <a16:creationId xmlns:a16="http://schemas.microsoft.com/office/drawing/2014/main" id="{619A15C1-D12F-45F2-900B-1A50BE8FCC5B}"/>
+              </a:ext>
+            </a:extLst>
+          </p:cNvPr>
+          <p:cNvPicPr>
+            <a:picLocks noChangeAspect="1"/>
+          </p:cNvPicPr>
+          <p:nvPr/>
+        </p:nvPicPr>
+        <p:blipFill>
+          <a:blip r:embed="rId2"/>
+          <a:stretch>
+            <a:fillRect/>
+          </a:stretch>
+        </p:blipFill>
+        <p:spPr>
+          <a:xfrm>
+            <a:off x="633999" y="1146563"/>
+            <a:ext cx="6912217" cy="4575135"/>
+          </a:xfrm>
+          <a:prstGeom prst="rect">
+            <a:avLst/>
+          </a:prstGeom>
+        </p:spPr>
+      </p:pic>
+      <p:sp>
+        <p:nvSpPr>
+          <p:cNvPr id="11" name="Content Placeholder 8">
+            <a:extLst>
+              <a:ext uri="{FF2B5EF4-FFF2-40B4-BE49-F238E27FC236}">
+                <a16:creationId xmlns:a16="http://schemas.microsoft.com/office/drawing/2014/main" id="{CB52472F-5F36-4048-AEEF-709278F06577}"/>
+              </a:ext>
+            </a:extLst>
+          </p:cNvPr>
+          <p:cNvSpPr>
+            <a:spLocks noGrp="1"/>
+          </p:cNvSpPr>
+          <p:nvPr>
+            <p:ph idx="1"/>
+          </p:nvPr>
+        </p:nvSpPr>
+        <p:spPr>
+          <a:xfrm>
+            <a:off x="7865805" y="2121408"/>
+            <a:ext cx="3677263" cy="4092579"/>
+          </a:xfrm>
+        </p:spPr>
+        <p:txBody>
+          <a:bodyPr>
+            <a:normAutofit/>
+          </a:bodyPr>
+          <a:lstStyle/>
+          <a:p>
+            <a:r>
+              <a:rPr lang="hu-HU" sz="1600" dirty="0"/>
+              <a:t>Itt jobb a validációs </a:t>
+            </a:r>
+            <a:r>
+              <a:rPr lang="hu-HU" sz="1600" dirty="0" err="1"/>
+              <a:t>score</a:t>
+            </a:r>
+            <a:r>
+              <a:rPr lang="hu-HU" sz="1600" dirty="0"/>
+              <a:t>, mint a </a:t>
+            </a:r>
+            <a:r>
+              <a:rPr lang="hu-HU" sz="1600" dirty="0" err="1"/>
+              <a:t>train</a:t>
+            </a:r>
+            <a:r>
+              <a:rPr lang="hu-HU" sz="1600" dirty="0"/>
+              <a:t> </a:t>
+            </a:r>
+            <a:r>
+              <a:rPr lang="hu-HU" sz="1600" dirty="0" err="1"/>
+              <a:t>scoreja</a:t>
+            </a:r>
+            <a:endParaRPr lang="hu-HU" sz="1600" dirty="0"/>
+          </a:p>
+          <a:p>
+            <a:r>
+              <a:rPr lang="hu-HU" sz="1600" dirty="0"/>
+              <a:t>Jól látható, hogy az egész igazából a min </a:t>
+            </a:r>
+            <a:r>
+              <a:rPr lang="hu-HU" sz="1600" dirty="0" err="1"/>
+              <a:t>samples</a:t>
+            </a:r>
+            <a:r>
+              <a:rPr lang="hu-HU" sz="1600" dirty="0"/>
+              <a:t> csökkentésével növekszik</a:t>
+            </a:r>
+            <a:endParaRPr lang="en-US" sz="1600" dirty="0"/>
+          </a:p>
+        </p:txBody>
+      </p:sp>
+    </p:spTree>
+    <p:extLst>
+      <p:ext uri="{BB962C8B-B14F-4D97-AF65-F5344CB8AC3E}">
+        <p14:creationId xmlns:p14="http://schemas.microsoft.com/office/powerpoint/2010/main" val="2921876343"/>
+      </p:ext>
+    </p:extLst>
+  </p:cSld>
+  <p:clrMapOvr>
+    <a:masterClrMapping/>
+  </p:clrMapOvr>
+</p:sld>
+</file>
+
+<file path=ppt/slides/slide26.xml><?xml version="1.0" encoding="utf-8"?>
+<p:sld xmlns:a="http://schemas.openxmlformats.org/drawingml/2006/main" xmlns:r="http://schemas.openxmlformats.org/officeDocument/2006/relationships" xmlns:p="http://schemas.openxmlformats.org/presentationml/2006/main">
+  <p:cSld>
+    <p:bg>
+      <p:bgPr>
+        <a:solidFill>
+          <a:schemeClr val="bg1"/>
+        </a:solidFill>
+        <a:effectLst/>
+      </p:bgPr>
+    </p:bg>
+    <p:spTree>
+      <p:nvGrpSpPr>
+        <p:cNvPr id="1" name=""/>
+        <p:cNvGrpSpPr/>
+        <p:nvPr/>
+      </p:nvGrpSpPr>
+      <p:grpSpPr>
+        <a:xfrm>
+          <a:off x="0" y="0"/>
+          <a:ext cx="0" cy="0"/>
+          <a:chOff x="0" y="0"/>
+          <a:chExt cx="0" cy="0"/>
+        </a:xfrm>
+      </p:grpSpPr>
+      <p:sp>
+        <p:nvSpPr>
+          <p:cNvPr id="2" name="Cím 1">
+            <a:extLst>
+              <a:ext uri="{FF2B5EF4-FFF2-40B4-BE49-F238E27FC236}">
+                <a16:creationId xmlns:a16="http://schemas.microsoft.com/office/drawing/2014/main" id="{197F3998-683E-4E8A-9117-340C0C62B878}"/>
+              </a:ext>
+            </a:extLst>
+          </p:cNvPr>
+          <p:cNvSpPr>
+            <a:spLocks noGrp="1"/>
+          </p:cNvSpPr>
+          <p:nvPr>
+            <p:ph type="title"/>
+          </p:nvPr>
+        </p:nvSpPr>
+        <p:spPr>
+          <a:xfrm>
+            <a:off x="7865806" y="484632"/>
+            <a:ext cx="3677264" cy="1609344"/>
+          </a:xfrm>
+        </p:spPr>
+        <p:txBody>
+          <a:bodyPr>
+            <a:normAutofit fontScale="90000"/>
+          </a:bodyPr>
+          <a:lstStyle/>
+          <a:p>
+            <a:r>
+              <a:rPr lang="hu-HU" sz="3600" dirty="0"/>
+              <a:t>Decision </a:t>
+            </a:r>
+            <a:r>
+              <a:rPr lang="hu-HU" sz="3600" dirty="0" err="1"/>
+              <a:t>tree</a:t>
+            </a:r>
+            <a:r>
+              <a:rPr lang="hu-HU" sz="3600" dirty="0"/>
+              <a:t> </a:t>
+            </a:r>
+            <a:r>
+              <a:rPr lang="hu-HU" sz="3600" dirty="0" err="1"/>
+              <a:t>model</a:t>
+            </a:r>
+            <a:r>
+              <a:rPr lang="hu-HU" sz="3600" dirty="0"/>
+              <a:t> </a:t>
+            </a:r>
+            <a:r>
+              <a:rPr lang="hu-HU" sz="3600" dirty="0" err="1"/>
+              <a:t>with</a:t>
+            </a:r>
+            <a:r>
+              <a:rPr lang="hu-HU" sz="3600" dirty="0"/>
+              <a:t> </a:t>
+            </a:r>
+            <a:r>
+              <a:rPr lang="hu-HU" sz="3600" dirty="0" err="1"/>
+              <a:t>decreased</a:t>
+            </a:r>
+            <a:r>
+              <a:rPr lang="hu-HU" sz="3600" dirty="0"/>
+              <a:t> </a:t>
+            </a:r>
+            <a:r>
+              <a:rPr lang="hu-HU" sz="3600" dirty="0" err="1"/>
+              <a:t>min_samples_leaf</a:t>
+            </a:r>
+            <a:r>
+              <a:rPr lang="hu-HU" sz="3600" dirty="0"/>
+              <a:t> (</a:t>
+            </a:r>
+            <a:r>
+              <a:rPr lang="hu-HU" sz="3600" dirty="0" err="1"/>
+              <a:t>with</a:t>
+            </a:r>
+            <a:r>
+              <a:rPr lang="hu-HU" sz="3600" dirty="0"/>
+              <a:t> </a:t>
+            </a:r>
+            <a:r>
+              <a:rPr lang="hu-HU" sz="3600" dirty="0" err="1"/>
+              <a:t>svd</a:t>
+            </a:r>
+            <a:r>
+              <a:rPr lang="hu-HU" sz="3600" dirty="0"/>
+              <a:t>)</a:t>
+            </a:r>
+          </a:p>
+        </p:txBody>
+      </p:sp>
+      <p:pic>
+        <p:nvPicPr>
+          <p:cNvPr id="5" name="Tartalom helye 4" descr="A képen szöveg látható&#10;&#10;Automatikusan generált leírás">
+            <a:extLst>
+              <a:ext uri="{FF2B5EF4-FFF2-40B4-BE49-F238E27FC236}">
+                <a16:creationId xmlns:a16="http://schemas.microsoft.com/office/drawing/2014/main" id="{DE3909BC-E2DE-4CCC-8D6F-6B825A56036F}"/>
+              </a:ext>
+            </a:extLst>
+          </p:cNvPr>
+          <p:cNvPicPr>
+            <a:picLocks noChangeAspect="1"/>
+          </p:cNvPicPr>
+          <p:nvPr/>
+        </p:nvPicPr>
+        <p:blipFill>
+          <a:blip r:embed="rId2"/>
+          <a:stretch>
+            <a:fillRect/>
+          </a:stretch>
+        </p:blipFill>
+        <p:spPr>
+          <a:xfrm>
+            <a:off x="633999" y="1146563"/>
+            <a:ext cx="6912217" cy="4575135"/>
+          </a:xfrm>
+          <a:prstGeom prst="rect">
+            <a:avLst/>
+          </a:prstGeom>
+        </p:spPr>
+      </p:pic>
+    </p:spTree>
+    <p:extLst>
+      <p:ext uri="{BB962C8B-B14F-4D97-AF65-F5344CB8AC3E}">
+        <p14:creationId xmlns:p14="http://schemas.microsoft.com/office/powerpoint/2010/main" val="356027939"/>
       </p:ext>
     </p:extLst>
   </p:cSld>
@@ -8396,7 +10634,7 @@
         </p:blipFill>
         <p:spPr>
           <a:xfrm>
-            <a:off x="0" y="2714454"/>
+            <a:off x="0" y="4766084"/>
             <a:ext cx="12192000" cy="3249928"/>
           </a:xfrm>
           <a:prstGeom prst="rect">
@@ -8901,7 +11139,7 @@
         </p:blipFill>
         <p:spPr>
           <a:xfrm>
-            <a:off x="1059041" y="3609522"/>
+            <a:off x="1059041" y="3429000"/>
             <a:ext cx="10021699" cy="3248478"/>
           </a:xfrm>
           <a:prstGeom prst="rect">
@@ -9334,7 +11572,7 @@
         </p:blipFill>
         <p:spPr>
           <a:xfrm>
-            <a:off x="2854760" y="85467"/>
+            <a:off x="5614435" y="0"/>
             <a:ext cx="6482479" cy="6858000"/>
           </a:xfrm>
           <a:prstGeom prst="rect">

</xml_diff>